<commit_message>
check point - classification
Classification is too liberal, it's letting through some IIEs as SLEs. I will need to set a bottom floor for the frequency threshold as 1Hz, because anything below that is definitely not a SLE.
</commit_message>
<xml_diff>
--- a/13226009(epileptiformEvents).pptx
+++ b/13226009(epileptiformEvents).pptx
@@ -37,6 +37,8 @@
     <p:sldId id="282" r:id="rId33"/>
     <p:sldId id="283" r:id="rId34"/>
     <p:sldId id="284" r:id="rId35"/>
+    <p:sldId id="285" r:id="rId36"/>
+    <p:sldId id="286" r:id="rId37"/>
   </p:sldIdLst>
   <p:sldSz cx="10972800" cy="5486400" type="screen4x3"/>
   <p:notesSz cx="10972800" cy="5486400"/>
@@ -1452,6 +1454,104 @@
       <p:pic>
         <p:nvPicPr>
           <p:cNvPr descr="image-3-2.png" id="2" name="Media File"/>
+          <p:cNvPicPr>
+            <a:picLocks noChangeAspect="1"/>
+          </p:cNvPicPr>
+          <p:nvPr/>
+        </p:nvPicPr>
+        <p:blipFill>
+          <a:blip cstate="print" r:embed="rId2"/>
+          <a:stretch>
+            <a:fillRect/>
+          </a:stretch>
+        </p:blipFill>
+        <p:spPr>
+          <a:xfrm>
+            <a:off x="144672" y="0"/>
+            <a:ext cx="10683456" cy="5486400"/>
+          </a:xfrm>
+          <a:prstGeom prst="rect">
+            <a:avLst/>
+          </a:prstGeom>
+        </p:spPr>
+      </p:pic>
+    </p:spTree>
+  </p:cSld>
+  <p:clrMapOvr>
+    <a:masterClrMapping/>
+  </p:clrMapOvr>
+</p:sld>
+</file>
+
+<file path=ppt/slides/slide30.xml><?xml version="1.0" encoding="utf-8"?>
+<p:sld xmlns:p="http://schemas.openxmlformats.org/presentationml/2006/main" xmlns:a="http://schemas.openxmlformats.org/drawingml/2006/main" xmlns:r="http://schemas.openxmlformats.org/officeDocument/2006/relationships">
+  <p:cSld>
+    <p:spTree>
+      <p:nvGrpSpPr>
+        <p:cNvPr id="1" name=""/>
+        <p:cNvGrpSpPr/>
+        <p:nvPr/>
+      </p:nvGrpSpPr>
+      <p:grpSpPr>
+        <a:xfrm>
+          <a:off x="0" y="0"/>
+          <a:ext cx="0" cy="0"/>
+          <a:chOff x="0" y="0"/>
+          <a:chExt cx="0" cy="0"/>
+        </a:xfrm>
+      </p:grpSpPr>
+      <p:pic>
+        <p:nvPicPr>
+          <p:cNvPr descr="image-30-2.png" id="2" name="Media File"/>
+          <p:cNvPicPr>
+            <a:picLocks noChangeAspect="1"/>
+          </p:cNvPicPr>
+          <p:nvPr/>
+        </p:nvPicPr>
+        <p:blipFill>
+          <a:blip cstate="print" r:embed="rId2"/>
+          <a:stretch>
+            <a:fillRect/>
+          </a:stretch>
+        </p:blipFill>
+        <p:spPr>
+          <a:xfrm>
+            <a:off x="144672" y="0"/>
+            <a:ext cx="10683456" cy="5486400"/>
+          </a:xfrm>
+          <a:prstGeom prst="rect">
+            <a:avLst/>
+          </a:prstGeom>
+        </p:spPr>
+      </p:pic>
+    </p:spTree>
+  </p:cSld>
+  <p:clrMapOvr>
+    <a:masterClrMapping/>
+  </p:clrMapOvr>
+</p:sld>
+</file>
+
+<file path=ppt/slides/slide31.xml><?xml version="1.0" encoding="utf-8"?>
+<p:sld xmlns:p="http://schemas.openxmlformats.org/presentationml/2006/main" xmlns:a="http://schemas.openxmlformats.org/drawingml/2006/main" xmlns:r="http://schemas.openxmlformats.org/officeDocument/2006/relationships">
+  <p:cSld>
+    <p:spTree>
+      <p:nvGrpSpPr>
+        <p:cNvPr id="1" name=""/>
+        <p:cNvGrpSpPr/>
+        <p:nvPr/>
+      </p:nvGrpSpPr>
+      <p:grpSpPr>
+        <a:xfrm>
+          <a:off x="0" y="0"/>
+          <a:ext cx="0" cy="0"/>
+          <a:chOff x="0" y="0"/>
+          <a:chExt cx="0" cy="0"/>
+        </a:xfrm>
+      </p:grpSpPr>
+      <p:pic>
+        <p:nvPicPr>
+          <p:cNvPr descr="image-31-2.png" id="2" name="Media File"/>
           <p:cNvPicPr>
             <a:picLocks noChangeAspect="1"/>
           </p:cNvPicPr>

</xml_diff>